<commit_message>
Updates e sula T2-A07 e T1-A08
</commit_message>
<xml_diff>
--- a/aulas/t/SCO-T1-A05-A06.pptx
+++ b/aulas/t/SCO-T1-A05-A06.pptx
@@ -7177,11 +7177,25 @@
                 <a:latin typeface="Courier New" panose="02070309020205020404" pitchFamily="49" charset="0"/>
                 <a:cs typeface="Courier New" panose="02070309020205020404" pitchFamily="49" charset="0"/>
               </a:rPr>
-              <a:t>, [R1 + #4]</a:t>
+              <a:t>, [R1 + #</a:t>
+            </a:r>
+            <a:r>
+              <a:rPr lang="en-GB" sz="1600" i="0">
+                <a:solidFill>
+                  <a:srgbClr val="0070C0"/>
+                </a:solidFill>
+                <a:latin typeface="Courier New" panose="02070309020205020404" pitchFamily="49" charset="0"/>
+                <a:cs typeface="Courier New" panose="02070309020205020404" pitchFamily="49" charset="0"/>
+              </a:rPr>
+              <a:t>4]!</a:t>
+            </a:r>
+            <a:r>
+              <a:rPr lang="pt-BR" sz="1600" b="0" i="0"/>
+              <a:t>”, </a:t>
             </a:r>
             <a:r>
               <a:rPr lang="pt-BR" sz="1600" b="0" i="0" dirty="0"/>
-              <a:t>”, O registo R1 é imcrementado de 4 sendo depois colocado o valor do registo R3 no endereço dado por R1 (apontador);</a:t>
+              <a:t>O registo R1 é imcrementado de 4 sendo depois colocado o valor do registo R3 no endereço dado por R1 (apontador);</a:t>
             </a:r>
           </a:p>
           <a:p>

</xml_diff>